<commit_message>
alpha: fix reactive frontend_web and add order details in order component
</commit_message>
<xml_diff>
--- a/docs/PPT.pptx
+++ b/docs/PPT.pptx
@@ -8595,13 +8595,20 @@
     <a:masterClrMapping/>
   </p:clrMapOvr>
   <mc:AlternateContent xmlns:mc="http://schemas.openxmlformats.org/markup-compatibility/2006">
-    <mc:Choice xmlns="" xmlns:p14="http://schemas.microsoft.com/office/powerpoint/2010/main" xmlns:p15="http://schemas.microsoft.com/office/powerpoint/2012/main" Requires="p14">
+    <mc:Choice xmlns:p15="http://schemas.microsoft.com/office/powerpoint/2012/main" xmlns:p14="http://schemas.microsoft.com/office/powerpoint/2010/main" xmlns="" Requires="p14">
       <p:transition spd="slow" p14:dur="2000"/>
     </mc:Choice>
     <mc:Fallback>
       <p:transition spd="slow"/>
     </mc:Fallback>
   </mc:AlternateContent>
+  <p:timing>
+    <p:tnLst>
+      <p:par>
+        <p:cTn id="1" dur="indefinite" restart="never" nodeType="tmRoot"/>
+      </p:par>
+    </p:tnLst>
+  </p:timing>
 </p:sld>
 </file>
 
@@ -8890,13 +8897,20 @@
     <a:masterClrMapping/>
   </p:clrMapOvr>
   <mc:AlternateContent xmlns:mc="http://schemas.openxmlformats.org/markup-compatibility/2006">
-    <mc:Choice xmlns="" xmlns:p14="http://schemas.microsoft.com/office/powerpoint/2010/main" xmlns:p15="http://schemas.microsoft.com/office/powerpoint/2012/main" Requires="p14">
+    <mc:Choice xmlns:p15="http://schemas.microsoft.com/office/powerpoint/2012/main" xmlns:p14="http://schemas.microsoft.com/office/powerpoint/2010/main" xmlns="" Requires="p14">
       <p:transition spd="slow" p14:dur="2000"/>
     </mc:Choice>
     <mc:Fallback>
       <p:transition spd="slow"/>
     </mc:Fallback>
   </mc:AlternateContent>
+  <p:timing>
+    <p:tnLst>
+      <p:par>
+        <p:cTn id="1" dur="indefinite" restart="never" nodeType="tmRoot"/>
+      </p:par>
+    </p:tnLst>
+  </p:timing>
 </p:sld>
 </file>
 
@@ -9185,13 +9199,20 @@
     <a:masterClrMapping/>
   </p:clrMapOvr>
   <mc:AlternateContent xmlns:mc="http://schemas.openxmlformats.org/markup-compatibility/2006">
-    <mc:Choice xmlns="" xmlns:p14="http://schemas.microsoft.com/office/powerpoint/2010/main" xmlns:p15="http://schemas.microsoft.com/office/powerpoint/2012/main" Requires="p14">
+    <mc:Choice xmlns:p15="http://schemas.microsoft.com/office/powerpoint/2012/main" xmlns:p14="http://schemas.microsoft.com/office/powerpoint/2010/main" xmlns="" Requires="p14">
       <p:transition spd="slow" p14:dur="2000"/>
     </mc:Choice>
     <mc:Fallback>
       <p:transition spd="slow"/>
     </mc:Fallback>
   </mc:AlternateContent>
+  <p:timing>
+    <p:tnLst>
+      <p:par>
+        <p:cTn id="1" dur="indefinite" restart="never" nodeType="tmRoot"/>
+      </p:par>
+    </p:tnLst>
+  </p:timing>
 </p:sld>
 </file>
 
@@ -9655,13 +9676,20 @@
     <a:masterClrMapping/>
   </p:clrMapOvr>
   <mc:AlternateContent xmlns:mc="http://schemas.openxmlformats.org/markup-compatibility/2006">
-    <mc:Choice xmlns="" xmlns:p14="http://schemas.microsoft.com/office/powerpoint/2010/main" xmlns:p15="http://schemas.microsoft.com/office/powerpoint/2012/main" Requires="p14">
+    <mc:Choice xmlns:p15="http://schemas.microsoft.com/office/powerpoint/2012/main" xmlns:p14="http://schemas.microsoft.com/office/powerpoint/2010/main" xmlns="" Requires="p14">
       <p:transition spd="slow" p14:dur="2000"/>
     </mc:Choice>
     <mc:Fallback>
       <p:transition spd="slow"/>
     </mc:Fallback>
   </mc:AlternateContent>
+  <p:timing>
+    <p:tnLst>
+      <p:par>
+        <p:cTn id="1" dur="indefinite" restart="never" nodeType="tmRoot"/>
+      </p:par>
+    </p:tnLst>
+  </p:timing>
 </p:sld>
 </file>
 
@@ -10175,13 +10203,20 @@
     <a:masterClrMapping/>
   </p:clrMapOvr>
   <mc:AlternateContent xmlns:mc="http://schemas.openxmlformats.org/markup-compatibility/2006">
-    <mc:Choice xmlns="" xmlns:p14="http://schemas.microsoft.com/office/powerpoint/2010/main" xmlns:p15="http://schemas.microsoft.com/office/powerpoint/2012/main" Requires="p14">
+    <mc:Choice xmlns:p15="http://schemas.microsoft.com/office/powerpoint/2012/main" xmlns:p14="http://schemas.microsoft.com/office/powerpoint/2010/main" xmlns="" Requires="p14">
       <p:transition spd="slow" p14:dur="2000"/>
     </mc:Choice>
     <mc:Fallback>
       <p:transition spd="slow"/>
     </mc:Fallback>
   </mc:AlternateContent>
+  <p:timing>
+    <p:tnLst>
+      <p:par>
+        <p:cTn id="1" dur="indefinite" restart="never" nodeType="tmRoot"/>
+      </p:par>
+    </p:tnLst>
+  </p:timing>
 </p:sld>
 </file>
 
@@ -10362,13 +10397,20 @@
     <a:masterClrMapping/>
   </p:clrMapOvr>
   <mc:AlternateContent xmlns:mc="http://schemas.openxmlformats.org/markup-compatibility/2006">
-    <mc:Choice xmlns="" xmlns:p14="http://schemas.microsoft.com/office/powerpoint/2010/main" xmlns:p15="http://schemas.microsoft.com/office/powerpoint/2012/main" Requires="p14">
+    <mc:Choice xmlns:p15="http://schemas.microsoft.com/office/powerpoint/2012/main" xmlns:p14="http://schemas.microsoft.com/office/powerpoint/2010/main" xmlns="" Requires="p14">
       <p:transition spd="slow" p14:dur="2000"/>
     </mc:Choice>
     <mc:Fallback>
       <p:transition spd="slow"/>
     </mc:Fallback>
   </mc:AlternateContent>
+  <p:timing>
+    <p:tnLst>
+      <p:par>
+        <p:cTn id="1" dur="indefinite" restart="never" nodeType="tmRoot"/>
+      </p:par>
+    </p:tnLst>
+  </p:timing>
 </p:sld>
 </file>
 
@@ -11631,13 +11673,20 @@
     <a:masterClrMapping/>
   </p:clrMapOvr>
   <mc:AlternateContent xmlns:mc="http://schemas.openxmlformats.org/markup-compatibility/2006">
-    <mc:Choice xmlns="" xmlns:p14="http://schemas.microsoft.com/office/powerpoint/2010/main" xmlns:p15="http://schemas.microsoft.com/office/powerpoint/2012/main" Requires="p14">
+    <mc:Choice xmlns:p15="http://schemas.microsoft.com/office/powerpoint/2012/main" xmlns:p14="http://schemas.microsoft.com/office/powerpoint/2010/main" xmlns="" Requires="p14">
       <p:transition spd="slow" p14:dur="2000"/>
     </mc:Choice>
     <mc:Fallback>
       <p:transition spd="slow"/>
     </mc:Fallback>
   </mc:AlternateContent>
+  <p:timing>
+    <p:tnLst>
+      <p:par>
+        <p:cTn id="1" dur="indefinite" restart="never" nodeType="tmRoot"/>
+      </p:par>
+    </p:tnLst>
+  </p:timing>
 </p:sld>
 </file>
 
@@ -11818,13 +11867,20 @@
     <a:masterClrMapping/>
   </p:clrMapOvr>
   <mc:AlternateContent xmlns:mc="http://schemas.openxmlformats.org/markup-compatibility/2006">
-    <mc:Choice xmlns="" xmlns:p14="http://schemas.microsoft.com/office/powerpoint/2010/main" xmlns:p15="http://schemas.microsoft.com/office/powerpoint/2012/main" Requires="p14">
+    <mc:Choice xmlns:p15="http://schemas.microsoft.com/office/powerpoint/2012/main" xmlns:p14="http://schemas.microsoft.com/office/powerpoint/2010/main" xmlns="" Requires="p14">
       <p:transition spd="slow" p14:dur="2000"/>
     </mc:Choice>
     <mc:Fallback>
       <p:transition spd="slow"/>
     </mc:Fallback>
   </mc:AlternateContent>
+  <p:timing>
+    <p:tnLst>
+      <p:par>
+        <p:cTn id="1" dur="indefinite" restart="never" nodeType="tmRoot"/>
+      </p:par>
+    </p:tnLst>
+  </p:timing>
 </p:sld>
 </file>
 
@@ -12042,13 +12098,20 @@
     <a:masterClrMapping/>
   </p:clrMapOvr>
   <mc:AlternateContent xmlns:mc="http://schemas.openxmlformats.org/markup-compatibility/2006">
-    <mc:Choice xmlns="" xmlns:p14="http://schemas.microsoft.com/office/powerpoint/2010/main" xmlns:p15="http://schemas.microsoft.com/office/powerpoint/2012/main" Requires="p14">
+    <mc:Choice xmlns:p15="http://schemas.microsoft.com/office/powerpoint/2012/main" xmlns:p14="http://schemas.microsoft.com/office/powerpoint/2010/main" xmlns="" Requires="p14">
       <p:transition spd="slow" p14:dur="2000"/>
     </mc:Choice>
     <mc:Fallback>
       <p:transition spd="slow"/>
     </mc:Fallback>
   </mc:AlternateContent>
+  <p:timing>
+    <p:tnLst>
+      <p:par>
+        <p:cTn id="1" dur="indefinite" restart="never" nodeType="tmRoot"/>
+      </p:par>
+    </p:tnLst>
+  </p:timing>
 </p:sld>
 </file>
 
@@ -12229,13 +12292,20 @@
     <a:masterClrMapping/>
   </p:clrMapOvr>
   <mc:AlternateContent xmlns:mc="http://schemas.openxmlformats.org/markup-compatibility/2006">
-    <mc:Choice xmlns="" xmlns:p14="http://schemas.microsoft.com/office/powerpoint/2010/main" xmlns:p15="http://schemas.microsoft.com/office/powerpoint/2012/main" Requires="p14">
+    <mc:Choice xmlns:p15="http://schemas.microsoft.com/office/powerpoint/2012/main" xmlns:p14="http://schemas.microsoft.com/office/powerpoint/2010/main" xmlns="" Requires="p14">
       <p:transition spd="slow" p14:dur="2000"/>
     </mc:Choice>
     <mc:Fallback>
       <p:transition spd="slow"/>
     </mc:Fallback>
   </mc:AlternateContent>
+  <p:timing>
+    <p:tnLst>
+      <p:par>
+        <p:cTn id="1" dur="indefinite" restart="never" nodeType="tmRoot"/>
+      </p:par>
+    </p:tnLst>
+  </p:timing>
 </p:sld>
 </file>
 
@@ -12453,13 +12523,20 @@
     <a:masterClrMapping/>
   </p:clrMapOvr>
   <mc:AlternateContent xmlns:mc="http://schemas.openxmlformats.org/markup-compatibility/2006">
-    <mc:Choice xmlns="" xmlns:p14="http://schemas.microsoft.com/office/powerpoint/2010/main" xmlns:p15="http://schemas.microsoft.com/office/powerpoint/2012/main" Requires="p14">
+    <mc:Choice xmlns:p15="http://schemas.microsoft.com/office/powerpoint/2012/main" xmlns:p14="http://schemas.microsoft.com/office/powerpoint/2010/main" xmlns="" Requires="p14">
       <p:transition spd="slow" p14:dur="2000"/>
     </mc:Choice>
     <mc:Fallback>
       <p:transition spd="slow"/>
     </mc:Fallback>
   </mc:AlternateContent>
+  <p:timing>
+    <p:tnLst>
+      <p:par>
+        <p:cTn id="1" dur="indefinite" restart="never" nodeType="tmRoot"/>
+      </p:par>
+    </p:tnLst>
+  </p:timing>
 </p:sld>
 </file>
 
@@ -13594,13 +13671,20 @@
     <a:masterClrMapping/>
   </p:clrMapOvr>
   <mc:AlternateContent xmlns:mc="http://schemas.openxmlformats.org/markup-compatibility/2006">
-    <mc:Choice xmlns="" xmlns:p14="http://schemas.microsoft.com/office/powerpoint/2010/main" xmlns:p15="http://schemas.microsoft.com/office/powerpoint/2012/main" Requires="p14">
+    <mc:Choice xmlns:p15="http://schemas.microsoft.com/office/powerpoint/2012/main" xmlns:p14="http://schemas.microsoft.com/office/powerpoint/2010/main" xmlns="" Requires="p14">
       <p:transition spd="slow" p14:dur="2000"/>
     </mc:Choice>
     <mc:Fallback>
       <p:transition spd="slow"/>
     </mc:Fallback>
   </mc:AlternateContent>
+  <p:timing>
+    <p:tnLst>
+      <p:par>
+        <p:cTn id="1" dur="indefinite" restart="never" nodeType="tmRoot"/>
+      </p:par>
+    </p:tnLst>
+  </p:timing>
 </p:sld>
 </file>
 
@@ -13781,13 +13865,20 @@
     <a:masterClrMapping/>
   </p:clrMapOvr>
   <mc:AlternateContent xmlns:mc="http://schemas.openxmlformats.org/markup-compatibility/2006">
-    <mc:Choice xmlns="" xmlns:p14="http://schemas.microsoft.com/office/powerpoint/2010/main" xmlns:p15="http://schemas.microsoft.com/office/powerpoint/2012/main" Requires="p14">
+    <mc:Choice xmlns:p15="http://schemas.microsoft.com/office/powerpoint/2012/main" xmlns:p14="http://schemas.microsoft.com/office/powerpoint/2010/main" xmlns="" Requires="p14">
       <p:transition spd="slow" p14:dur="2000"/>
     </mc:Choice>
     <mc:Fallback>
       <p:transition spd="slow"/>
     </mc:Fallback>
   </mc:AlternateContent>
+  <p:timing>
+    <p:tnLst>
+      <p:par>
+        <p:cTn id="1" dur="indefinite" restart="never" nodeType="tmRoot"/>
+      </p:par>
+    </p:tnLst>
+  </p:timing>
 </p:sld>
 </file>
 
@@ -14005,13 +14096,20 @@
     <a:masterClrMapping/>
   </p:clrMapOvr>
   <mc:AlternateContent xmlns:mc="http://schemas.openxmlformats.org/markup-compatibility/2006">
-    <mc:Choice xmlns="" xmlns:p14="http://schemas.microsoft.com/office/powerpoint/2010/main" xmlns:p15="http://schemas.microsoft.com/office/powerpoint/2012/main" Requires="p14">
+    <mc:Choice xmlns:p15="http://schemas.microsoft.com/office/powerpoint/2012/main" xmlns:p14="http://schemas.microsoft.com/office/powerpoint/2010/main" xmlns="" Requires="p14">
       <p:transition spd="slow" p14:dur="2000"/>
     </mc:Choice>
     <mc:Fallback>
       <p:transition spd="slow"/>
     </mc:Fallback>
   </mc:AlternateContent>
+  <p:timing>
+    <p:tnLst>
+      <p:par>
+        <p:cTn id="1" dur="indefinite" restart="never" nodeType="tmRoot"/>
+      </p:par>
+    </p:tnLst>
+  </p:timing>
 </p:sld>
 </file>
 
@@ -14192,13 +14290,20 @@
     <a:masterClrMapping/>
   </p:clrMapOvr>
   <mc:AlternateContent xmlns:mc="http://schemas.openxmlformats.org/markup-compatibility/2006">
-    <mc:Choice xmlns="" xmlns:p14="http://schemas.microsoft.com/office/powerpoint/2010/main" xmlns:p15="http://schemas.microsoft.com/office/powerpoint/2012/main" Requires="p14">
+    <mc:Choice xmlns:p15="http://schemas.microsoft.com/office/powerpoint/2012/main" xmlns:p14="http://schemas.microsoft.com/office/powerpoint/2010/main" xmlns="" Requires="p14">
       <p:transition spd="slow" p14:dur="2000"/>
     </mc:Choice>
     <mc:Fallback>
       <p:transition spd="slow"/>
     </mc:Fallback>
   </mc:AlternateContent>
+  <p:timing>
+    <p:tnLst>
+      <p:par>
+        <p:cTn id="1" dur="indefinite" restart="never" nodeType="tmRoot"/>
+      </p:par>
+    </p:tnLst>
+  </p:timing>
 </p:sld>
 </file>
 
@@ -14458,18 +14563,24 @@
           <a:lstStyle/>
           <a:p>
             <a:r>
-              <a:rPr lang="en-US" sz="1200" b="1" strike="noStrike" spc="-1">
+              <a:rPr lang="en-US" sz="1200" b="1" strike="noStrike" spc="-1" dirty="0" smtClean="0">
                 <a:solidFill>
                   <a:srgbClr val="FFFFFF"/>
                 </a:solidFill>
                 <a:latin typeface="Arial"/>
               </a:rPr>
-              <a:t>21-23 June 2023</a:t>
+              <a:t>21 - 23 April 2023</a:t>
             </a:r>
+            <a:endParaRPr lang="en-US" sz="1200" b="1" strike="noStrike" spc="-1" dirty="0">
+              <a:solidFill>
+                <a:srgbClr val="FFFFFF"/>
+              </a:solidFill>
+              <a:latin typeface="Arial"/>
+            </a:endParaRPr>
           </a:p>
           <a:p>
             <a:r>
-              <a:rPr lang="en-US" sz="1200" b="1" strike="noStrike" spc="-1">
+              <a:rPr lang="en-US" sz="1200" b="1" strike="noStrike" spc="-1" dirty="0">
                 <a:solidFill>
                   <a:srgbClr val="FFFFFF"/>
                 </a:solidFill>
@@ -14516,18 +14627,32 @@
           <a:lstStyle/>
           <a:p>
             <a:r>
-              <a:rPr lang="en-US" sz="1200" b="1" strike="noStrike" spc="-1">
+              <a:rPr lang="en-US" sz="1200" b="1" strike="noStrike" spc="-1" dirty="0" smtClean="0">
                 <a:solidFill>
                   <a:srgbClr val="FFFFFF"/>
                 </a:solidFill>
                 <a:latin typeface="Arial"/>
               </a:rPr>
-              <a:t>24-27 June 2023</a:t>
+              <a:t>24 - 27 </a:t>
             </a:r>
-          </a:p>
-          <a:p>
             <a:r>
-              <a:rPr lang="en-US" sz="1200" b="1" strike="noStrike" spc="-1">
+              <a:rPr lang="en-US" sz="1200" b="1" spc="-1" dirty="0" smtClean="0">
+                <a:solidFill>
+                  <a:srgbClr val="FFFFFF"/>
+                </a:solidFill>
+              </a:rPr>
+              <a:t>April 2023</a:t>
+            </a:r>
+            <a:endParaRPr lang="en-US" sz="1200" b="1" strike="noStrike" spc="-1" dirty="0">
+              <a:solidFill>
+                <a:srgbClr val="FFFFFF"/>
+              </a:solidFill>
+              <a:latin typeface="Arial"/>
+            </a:endParaRPr>
+          </a:p>
+          <a:p>
+            <a:r>
+              <a:rPr lang="en-US" sz="1200" b="1" strike="noStrike" spc="-1" dirty="0">
                 <a:solidFill>
                   <a:srgbClr val="FFFFFF"/>
                 </a:solidFill>
@@ -14574,18 +14699,32 @@
           <a:lstStyle/>
           <a:p>
             <a:r>
-              <a:rPr lang="en-US" sz="1200" b="1" strike="noStrike" spc="-1">
+              <a:rPr lang="en-US" sz="1200" b="1" strike="noStrike" spc="-1" dirty="0" smtClean="0">
                 <a:solidFill>
                   <a:srgbClr val="FFFFFF"/>
                 </a:solidFill>
                 <a:latin typeface="Arial"/>
               </a:rPr>
-              <a:t>28-30 June 2023</a:t>
+              <a:t>28 - 30 </a:t>
             </a:r>
-          </a:p>
-          <a:p>
             <a:r>
-              <a:rPr lang="en-US" sz="1200" b="1" strike="noStrike" spc="-1">
+              <a:rPr lang="en-US" sz="1200" b="1" spc="-1" dirty="0" smtClean="0">
+                <a:solidFill>
+                  <a:srgbClr val="FFFFFF"/>
+                </a:solidFill>
+              </a:rPr>
+              <a:t>April 2023</a:t>
+            </a:r>
+            <a:endParaRPr lang="en-US" sz="1200" b="1" strike="noStrike" spc="-1" dirty="0">
+              <a:solidFill>
+                <a:srgbClr val="FFFFFF"/>
+              </a:solidFill>
+              <a:latin typeface="Arial"/>
+            </a:endParaRPr>
+          </a:p>
+          <a:p>
+            <a:r>
+              <a:rPr lang="en-US" sz="1200" b="1" strike="noStrike" spc="-1" dirty="0">
                 <a:solidFill>
                   <a:srgbClr val="FFFFFF"/>
                 </a:solidFill>
@@ -14632,18 +14771,44 @@
           <a:lstStyle/>
           <a:p>
             <a:r>
-              <a:rPr lang="en-US" sz="1200" b="1" strike="noStrike" spc="-1">
+              <a:rPr lang="en-US" sz="1200" b="1" strike="noStrike" spc="-1" dirty="0">
                 <a:solidFill>
                   <a:srgbClr val="FFFFFF"/>
                 </a:solidFill>
                 <a:latin typeface="Arial"/>
               </a:rPr>
-              <a:t>31 June – 2 May 2023</a:t>
+              <a:t>31 </a:t>
             </a:r>
-          </a:p>
-          <a:p>
             <a:r>
-              <a:rPr lang="en-US" sz="1200" b="1" strike="noStrike" spc="-1">
+              <a:rPr lang="en-US" sz="1200" b="1" spc="-1" dirty="0" smtClean="0">
+                <a:solidFill>
+                  <a:srgbClr val="FFFFFF"/>
+                </a:solidFill>
+              </a:rPr>
+              <a:t>April - </a:t>
+            </a:r>
+            <a:r>
+              <a:rPr lang="en-US" sz="1200" b="1" strike="noStrike" spc="-1" dirty="0" smtClean="0">
+                <a:solidFill>
+                  <a:srgbClr val="FFFFFF"/>
+                </a:solidFill>
+                <a:latin typeface="Arial"/>
+              </a:rPr>
+              <a:t>2 </a:t>
+            </a:r>
+            <a:r>
+              <a:rPr lang="en-US" sz="1200" b="1" strike="noStrike" spc="-1" dirty="0">
+                <a:solidFill>
+                  <a:srgbClr val="FFFFFF"/>
+                </a:solidFill>
+                <a:latin typeface="Arial"/>
+              </a:rPr>
+              <a:t>May 2023</a:t>
+            </a:r>
+          </a:p>
+          <a:p>
+            <a:r>
+              <a:rPr lang="en-US" sz="1200" b="1" strike="noStrike" spc="-1" dirty="0">
                 <a:solidFill>
                   <a:srgbClr val="FFFFFF"/>
                 </a:solidFill>
@@ -14718,13 +14883,20 @@
     <a:masterClrMapping/>
   </p:clrMapOvr>
   <mc:AlternateContent xmlns:mc="http://schemas.openxmlformats.org/markup-compatibility/2006">
-    <mc:Choice xmlns="" xmlns:p14="http://schemas.microsoft.com/office/powerpoint/2010/main" xmlns:p15="http://schemas.microsoft.com/office/powerpoint/2012/main" Requires="p14">
+    <mc:Choice xmlns:p15="http://schemas.microsoft.com/office/powerpoint/2012/main" xmlns:p14="http://schemas.microsoft.com/office/powerpoint/2010/main" xmlns="" Requires="p14">
       <p:transition spd="slow" p14:dur="2000"/>
     </mc:Choice>
     <mc:Fallback>
       <p:transition spd="slow"/>
     </mc:Fallback>
   </mc:AlternateContent>
+  <p:timing>
+    <p:tnLst>
+      <p:par>
+        <p:cTn id="1" dur="indefinite" restart="never" nodeType="tmRoot"/>
+      </p:par>
+    </p:tnLst>
+  </p:timing>
 </p:sld>
 </file>
 
@@ -14902,13 +15074,20 @@
     <a:masterClrMapping/>
   </p:clrMapOvr>
   <mc:AlternateContent xmlns:mc="http://schemas.openxmlformats.org/markup-compatibility/2006">
-    <mc:Choice xmlns="" xmlns:p14="http://schemas.microsoft.com/office/powerpoint/2010/main" xmlns:p15="http://schemas.microsoft.com/office/powerpoint/2012/main" Requires="p14">
+    <mc:Choice xmlns:p15="http://schemas.microsoft.com/office/powerpoint/2012/main" xmlns:p14="http://schemas.microsoft.com/office/powerpoint/2010/main" xmlns="" Requires="p14">
       <p:transition spd="slow" p14:dur="2000"/>
     </mc:Choice>
     <mc:Fallback>
       <p:transition spd="slow"/>
     </mc:Fallback>
   </mc:AlternateContent>
+  <p:timing>
+    <p:tnLst>
+      <p:par>
+        <p:cTn id="1" dur="indefinite" restart="never" nodeType="tmRoot"/>
+      </p:par>
+    </p:tnLst>
+  </p:timing>
 </p:sld>
 </file>
 
@@ -15168,13 +15347,20 @@
     <a:masterClrMapping/>
   </p:clrMapOvr>
   <mc:AlternateContent xmlns:mc="http://schemas.openxmlformats.org/markup-compatibility/2006">
-    <mc:Choice xmlns="" xmlns:p14="http://schemas.microsoft.com/office/powerpoint/2010/main" xmlns:p15="http://schemas.microsoft.com/office/powerpoint/2012/main" Requires="p14">
+    <mc:Choice xmlns:p15="http://schemas.microsoft.com/office/powerpoint/2012/main" xmlns:p14="http://schemas.microsoft.com/office/powerpoint/2010/main" xmlns="" Requires="p14">
       <p:transition spd="slow" p14:dur="2000"/>
     </mc:Choice>
     <mc:Fallback>
       <p:transition spd="slow"/>
     </mc:Fallback>
   </mc:AlternateContent>
+  <p:timing>
+    <p:tnLst>
+      <p:par>
+        <p:cTn id="1" dur="indefinite" restart="never" nodeType="tmRoot"/>
+      </p:par>
+    </p:tnLst>
+  </p:timing>
 </p:sld>
 </file>
 
@@ -15355,13 +15541,20 @@
     <a:masterClrMapping/>
   </p:clrMapOvr>
   <mc:AlternateContent xmlns:mc="http://schemas.openxmlformats.org/markup-compatibility/2006">
-    <mc:Choice xmlns="" xmlns:p14="http://schemas.microsoft.com/office/powerpoint/2010/main" xmlns:p15="http://schemas.microsoft.com/office/powerpoint/2012/main" Requires="p14">
+    <mc:Choice xmlns:p15="http://schemas.microsoft.com/office/powerpoint/2012/main" xmlns:p14="http://schemas.microsoft.com/office/powerpoint/2010/main" xmlns="" Requires="p14">
       <p:transition spd="slow" p14:dur="2000"/>
     </mc:Choice>
     <mc:Fallback>
       <p:transition spd="slow"/>
     </mc:Fallback>
   </mc:AlternateContent>
+  <p:timing>
+    <p:tnLst>
+      <p:par>
+        <p:cTn id="1" dur="indefinite" restart="never" nodeType="tmRoot"/>
+      </p:par>
+    </p:tnLst>
+  </p:timing>
 </p:sld>
 </file>
 
@@ -15930,13 +16123,20 @@
     <a:masterClrMapping/>
   </p:clrMapOvr>
   <mc:AlternateContent xmlns:mc="http://schemas.openxmlformats.org/markup-compatibility/2006">
-    <mc:Choice xmlns="" xmlns:p14="http://schemas.microsoft.com/office/powerpoint/2010/main" xmlns:p15="http://schemas.microsoft.com/office/powerpoint/2012/main" Requires="p14">
+    <mc:Choice xmlns:p15="http://schemas.microsoft.com/office/powerpoint/2012/main" xmlns:p14="http://schemas.microsoft.com/office/powerpoint/2010/main" xmlns="" Requires="p14">
       <p:transition spd="slow" p14:dur="2000"/>
     </mc:Choice>
     <mc:Fallback>
       <p:transition spd="slow"/>
     </mc:Fallback>
   </mc:AlternateContent>
+  <p:timing>
+    <p:tnLst>
+      <p:par>
+        <p:cTn id="1" dur="indefinite" restart="never" nodeType="tmRoot"/>
+      </p:par>
+    </p:tnLst>
+  </p:timing>
 </p:sld>
 </file>
 
@@ -16117,13 +16317,20 @@
     <a:masterClrMapping/>
   </p:clrMapOvr>
   <mc:AlternateContent xmlns:mc="http://schemas.openxmlformats.org/markup-compatibility/2006">
-    <mc:Choice xmlns="" xmlns:p14="http://schemas.microsoft.com/office/powerpoint/2010/main" xmlns:p15="http://schemas.microsoft.com/office/powerpoint/2012/main" Requires="p14">
+    <mc:Choice xmlns:p15="http://schemas.microsoft.com/office/powerpoint/2012/main" xmlns:p14="http://schemas.microsoft.com/office/powerpoint/2010/main" xmlns="" Requires="p14">
       <p:transition spd="slow" p14:dur="2000"/>
     </mc:Choice>
     <mc:Fallback>
       <p:transition spd="slow"/>
     </mc:Fallback>
   </mc:AlternateContent>
+  <p:timing>
+    <p:tnLst>
+      <p:par>
+        <p:cTn id="1" dur="indefinite" restart="never" nodeType="tmRoot"/>
+      </p:par>
+    </p:tnLst>
+  </p:timing>
 </p:sld>
 </file>
 
@@ -16687,13 +16894,20 @@
     <a:masterClrMapping/>
   </p:clrMapOvr>
   <mc:AlternateContent xmlns:mc="http://schemas.openxmlformats.org/markup-compatibility/2006">
-    <mc:Choice xmlns="" xmlns:p14="http://schemas.microsoft.com/office/powerpoint/2010/main" xmlns:p15="http://schemas.microsoft.com/office/powerpoint/2012/main" Requires="p14">
+    <mc:Choice xmlns:p15="http://schemas.microsoft.com/office/powerpoint/2012/main" xmlns:p14="http://schemas.microsoft.com/office/powerpoint/2010/main" xmlns="" Requires="p14">
       <p:transition spd="slow" p14:dur="2000"/>
     </mc:Choice>
     <mc:Fallback>
       <p:transition spd="slow"/>
     </mc:Fallback>
   </mc:AlternateContent>
+  <p:timing>
+    <p:tnLst>
+      <p:par>
+        <p:cTn id="1" dur="indefinite" restart="never" nodeType="tmRoot"/>
+      </p:par>
+    </p:tnLst>
+  </p:timing>
 </p:sld>
 </file>
 
@@ -16874,13 +17088,20 @@
     <a:masterClrMapping/>
   </p:clrMapOvr>
   <mc:AlternateContent xmlns:mc="http://schemas.openxmlformats.org/markup-compatibility/2006">
-    <mc:Choice xmlns="" xmlns:p14="http://schemas.microsoft.com/office/powerpoint/2010/main" xmlns:p15="http://schemas.microsoft.com/office/powerpoint/2012/main" Requires="p14">
+    <mc:Choice xmlns:p15="http://schemas.microsoft.com/office/powerpoint/2012/main" xmlns:p14="http://schemas.microsoft.com/office/powerpoint/2010/main" xmlns="" Requires="p14">
       <p:transition spd="slow" p14:dur="2000"/>
     </mc:Choice>
     <mc:Fallback>
       <p:transition spd="slow"/>
     </mc:Fallback>
   </mc:AlternateContent>
+  <p:timing>
+    <p:tnLst>
+      <p:par>
+        <p:cTn id="1" dur="indefinite" restart="never" nodeType="tmRoot"/>
+      </p:par>
+    </p:tnLst>
+  </p:timing>
 </p:sld>
 </file>
 
@@ -17394,13 +17615,20 @@
     <a:masterClrMapping/>
   </p:clrMapOvr>
   <mc:AlternateContent xmlns:mc="http://schemas.openxmlformats.org/markup-compatibility/2006">
-    <mc:Choice xmlns="" xmlns:p14="http://schemas.microsoft.com/office/powerpoint/2010/main" xmlns:p15="http://schemas.microsoft.com/office/powerpoint/2012/main" Requires="p14">
+    <mc:Choice xmlns:p15="http://schemas.microsoft.com/office/powerpoint/2012/main" xmlns:p14="http://schemas.microsoft.com/office/powerpoint/2010/main" xmlns="" Requires="p14">
       <p:transition spd="slow" p14:dur="2000"/>
     </mc:Choice>
     <mc:Fallback>
       <p:transition spd="slow"/>
     </mc:Fallback>
   </mc:AlternateContent>
+  <p:timing>
+    <p:tnLst>
+      <p:par>
+        <p:cTn id="1" dur="indefinite" restart="never" nodeType="tmRoot"/>
+      </p:par>
+    </p:tnLst>
+  </p:timing>
 </p:sld>
 </file>
 
@@ -17839,13 +18067,20 @@
     <a:masterClrMapping/>
   </p:clrMapOvr>
   <mc:AlternateContent xmlns:mc="http://schemas.openxmlformats.org/markup-compatibility/2006">
-    <mc:Choice xmlns="" xmlns:p14="http://schemas.microsoft.com/office/powerpoint/2010/main" xmlns:p15="http://schemas.microsoft.com/office/powerpoint/2012/main" Requires="p14">
+    <mc:Choice xmlns:p15="http://schemas.microsoft.com/office/powerpoint/2012/main" xmlns:p14="http://schemas.microsoft.com/office/powerpoint/2010/main" xmlns="" Requires="p14">
       <p:transition spd="slow" p14:dur="2000"/>
     </mc:Choice>
     <mc:Fallback>
       <p:transition spd="slow"/>
     </mc:Fallback>
   </mc:AlternateContent>
+  <p:timing>
+    <p:tnLst>
+      <p:par>
+        <p:cTn id="1" dur="indefinite" restart="never" nodeType="tmRoot"/>
+      </p:par>
+    </p:tnLst>
+  </p:timing>
 </p:sld>
 </file>
 

</xml_diff>